<commit_message>
Extracted clickers from pad file.
</commit_message>
<xml_diff>
--- a/instructor/l21/l21-pad.pptx
+++ b/instructor/l21/l21-pad.pptx
@@ -218,7 +218,7 @@
           <a:p>
             <a:fld id="{092B9134-588E-5B42-8C9F-617A27048C6A}" type="datetimeFigureOut">
               <a:rPr lang="en-US" smtClean="0"/>
-              <a:t>11/25/24</a:t>
+              <a:t>11/27/25</a:t>
             </a:fld>
             <a:endParaRPr lang="en-US"/>
           </a:p>
@@ -460,7 +460,7 @@
           <a:p>
             <a:fld id="{6901D574-2425-0C44-8C0A-ED186250828B}" type="datetimeFigureOut">
               <a:rPr lang="en-US" smtClean="0"/>
-              <a:t>11/25/24</a:t>
+              <a:t>11/27/25</a:t>
             </a:fld>
             <a:endParaRPr lang="en-US"/>
           </a:p>
@@ -658,7 +658,7 @@
           <a:p>
             <a:fld id="{6901D574-2425-0C44-8C0A-ED186250828B}" type="datetimeFigureOut">
               <a:rPr lang="en-US" smtClean="0"/>
-              <a:t>11/25/24</a:t>
+              <a:t>11/27/25</a:t>
             </a:fld>
             <a:endParaRPr lang="en-US"/>
           </a:p>
@@ -866,7 +866,7 @@
           <a:p>
             <a:fld id="{6901D574-2425-0C44-8C0A-ED186250828B}" type="datetimeFigureOut">
               <a:rPr lang="en-US" smtClean="0"/>
-              <a:t>11/25/24</a:t>
+              <a:t>11/27/25</a:t>
             </a:fld>
             <a:endParaRPr lang="en-US"/>
           </a:p>
@@ -1064,7 +1064,7 @@
           <a:p>
             <a:fld id="{6901D574-2425-0C44-8C0A-ED186250828B}" type="datetimeFigureOut">
               <a:rPr lang="en-US" smtClean="0"/>
-              <a:t>11/25/24</a:t>
+              <a:t>11/27/25</a:t>
             </a:fld>
             <a:endParaRPr lang="en-US"/>
           </a:p>
@@ -1339,7 +1339,7 @@
           <a:p>
             <a:fld id="{6901D574-2425-0C44-8C0A-ED186250828B}" type="datetimeFigureOut">
               <a:rPr lang="en-US" smtClean="0"/>
-              <a:t>11/25/24</a:t>
+              <a:t>11/27/25</a:t>
             </a:fld>
             <a:endParaRPr lang="en-US"/>
           </a:p>
@@ -1604,7 +1604,7 @@
           <a:p>
             <a:fld id="{6901D574-2425-0C44-8C0A-ED186250828B}" type="datetimeFigureOut">
               <a:rPr lang="en-US" smtClean="0"/>
-              <a:t>11/25/24</a:t>
+              <a:t>11/27/25</a:t>
             </a:fld>
             <a:endParaRPr lang="en-US"/>
           </a:p>
@@ -2016,7 +2016,7 @@
           <a:p>
             <a:fld id="{6901D574-2425-0C44-8C0A-ED186250828B}" type="datetimeFigureOut">
               <a:rPr lang="en-US" smtClean="0"/>
-              <a:t>11/25/24</a:t>
+              <a:t>11/27/25</a:t>
             </a:fld>
             <a:endParaRPr lang="en-US"/>
           </a:p>
@@ -2157,7 +2157,7 @@
           <a:p>
             <a:fld id="{6901D574-2425-0C44-8C0A-ED186250828B}" type="datetimeFigureOut">
               <a:rPr lang="en-US" smtClean="0"/>
-              <a:t>11/25/24</a:t>
+              <a:t>11/27/25</a:t>
             </a:fld>
             <a:endParaRPr lang="en-US"/>
           </a:p>
@@ -2270,7 +2270,7 @@
           <a:p>
             <a:fld id="{6901D574-2425-0C44-8C0A-ED186250828B}" type="datetimeFigureOut">
               <a:rPr lang="en-US" smtClean="0"/>
-              <a:t>11/25/24</a:t>
+              <a:t>11/27/25</a:t>
             </a:fld>
             <a:endParaRPr lang="en-US"/>
           </a:p>
@@ -2581,7 +2581,7 @@
           <a:p>
             <a:fld id="{6901D574-2425-0C44-8C0A-ED186250828B}" type="datetimeFigureOut">
               <a:rPr lang="en-US" smtClean="0"/>
-              <a:t>11/25/24</a:t>
+              <a:t>11/27/25</a:t>
             </a:fld>
             <a:endParaRPr lang="en-US"/>
           </a:p>
@@ -2869,7 +2869,7 @@
           <a:p>
             <a:fld id="{6901D574-2425-0C44-8C0A-ED186250828B}" type="datetimeFigureOut">
               <a:rPr lang="en-US" smtClean="0"/>
-              <a:t>11/25/24</a:t>
+              <a:t>11/27/25</a:t>
             </a:fld>
             <a:endParaRPr lang="en-US"/>
           </a:p>
@@ -3110,7 +3110,7 @@
           <a:p>
             <a:fld id="{6901D574-2425-0C44-8C0A-ED186250828B}" type="datetimeFigureOut">
               <a:rPr lang="en-US" smtClean="0"/>
-              <a:t>11/25/24</a:t>
+              <a:t>11/27/25</a:t>
             </a:fld>
             <a:endParaRPr lang="en-US"/>
           </a:p>
@@ -7282,17 +7282,17 @@
           <a:p>
             <a:r>
               <a:rPr lang="en-US" dirty="0"/>
-              <a:t>two functions</a:t>
+              <a:t>Clicker time!</a:t>
             </a:r>
           </a:p>
         </p:txBody>
       </p:sp>
       <p:sp>
         <p:nvSpPr>
-          <p:cNvPr id="3" name="Content Placeholder 2">
-            <a:extLst>
-              <a:ext uri="{FF2B5EF4-FFF2-40B4-BE49-F238E27FC236}">
-                <a16:creationId xmlns:a16="http://schemas.microsoft.com/office/drawing/2014/main" id="{49690B83-F688-DF99-78E9-264DBFA04EF8}"/>
+          <p:cNvPr id="5" name="Content Placeholder 4">
+            <a:extLst>
+              <a:ext uri="{FF2B5EF4-FFF2-40B4-BE49-F238E27FC236}">
+                <a16:creationId xmlns:a16="http://schemas.microsoft.com/office/drawing/2014/main" id="{68BBA30C-D1B8-F171-2F33-6B742773241C}"/>
               </a:ext>
             </a:extLst>
           </p:cNvPr>
@@ -7305,86 +7305,10 @@
         </p:nvSpPr>
         <p:spPr/>
         <p:txBody>
-          <a:bodyPr>
-            <a:normAutofit lnSpcReduction="10000"/>
-          </a:bodyPr>
+          <a:bodyPr/>
           <a:lstStyle/>
           <a:p>
-            <a:r>
-              <a:rPr lang="en-US" dirty="0" err="1"/>
-              <a:t>solveable</a:t>
-            </a:r>
-            <a:r>
-              <a:rPr lang="en-US" dirty="0"/>
-              <a:t>-no-revisits</a:t>
-            </a:r>
-          </a:p>
-          <a:p>
-            <a:pPr lvl="1"/>
-            <a:r>
-              <a:rPr lang="en-US" dirty="0"/>
-              <a:t>given maze m, is it possible to go from 0,0 to lower right</a:t>
-            </a:r>
-          </a:p>
-          <a:p>
-            <a:pPr lvl="1"/>
-            <a:r>
-              <a:rPr lang="en-US" dirty="0"/>
-              <a:t>function must not visit any position more than once</a:t>
-            </a:r>
-          </a:p>
-          <a:p>
-            <a:pPr lvl="1"/>
-            <a:r>
-              <a:rPr lang="en-US" dirty="0"/>
-              <a:t>(it can come to the position, but not pass through it)</a:t>
-            </a:r>
-          </a:p>
-          <a:p>
-            <a:pPr lvl="1"/>
-            <a:endParaRPr lang="en-US" dirty="0"/>
-          </a:p>
-          <a:p>
-            <a:pPr lvl="1"/>
-            <a:r>
-              <a:rPr lang="en-US" dirty="0"/>
-              <a:t>A) ordinary recursion    B) tail recursion</a:t>
-            </a:r>
-          </a:p>
-          <a:p>
-            <a:pPr lvl="1"/>
-            <a:endParaRPr lang="en-US" dirty="0"/>
-          </a:p>
-          <a:p>
-            <a:r>
-              <a:rPr lang="en-US" dirty="0"/>
-              <a:t>distance-from</a:t>
-            </a:r>
-          </a:p>
-          <a:p>
-            <a:pPr lvl="1"/>
-            <a:r>
-              <a:rPr lang="en-US" dirty="0"/>
-              <a:t>given maze m and positions and and b, if it is possible, starting at 0,0</a:t>
-            </a:r>
-            <a:br>
-              <a:rPr lang="en-US" dirty="0"/>
-            </a:br>
-            <a:r>
-              <a:rPr lang="en-US" dirty="0"/>
-              <a:t>to first reach a, and then reach b, produce distance from a to b</a:t>
-            </a:r>
-            <a:br>
-              <a:rPr lang="en-US" dirty="0"/>
-            </a:br>
-            <a:endParaRPr lang="en-US" dirty="0"/>
-          </a:p>
-          <a:p>
-            <a:pPr lvl="1"/>
-            <a:r>
-              <a:rPr lang="en-US" dirty="0"/>
-              <a:t>A) ordinary recursion   B) tail recursion</a:t>
-            </a:r>
+            <a:endParaRPr lang="en-US"/>
           </a:p>
         </p:txBody>
       </p:sp>

</xml_diff>